<commit_message>
Finished chapter 5 and 4.
</commit_message>
<xml_diff>
--- a/docs/resources/Fig10.pptx
+++ b/docs/resources/Fig10.pptx
@@ -259,7 +259,7 @@
           <a:p>
             <a:fld id="{3B1C6484-BAD2-482C-9516-CEAD9A582EF7}" type="datetimeFigureOut">
               <a:rPr lang="es-ES" smtClean="0"/>
-              <a:t>05/05/2019</a:t>
+              <a:t>20/05/2019</a:t>
             </a:fld>
             <a:endParaRPr lang="es-ES"/>
           </a:p>
@@ -457,7 +457,7 @@
           <a:p>
             <a:fld id="{3B1C6484-BAD2-482C-9516-CEAD9A582EF7}" type="datetimeFigureOut">
               <a:rPr lang="es-ES" smtClean="0"/>
-              <a:t>05/05/2019</a:t>
+              <a:t>20/05/2019</a:t>
             </a:fld>
             <a:endParaRPr lang="es-ES"/>
           </a:p>
@@ -665,7 +665,7 @@
           <a:p>
             <a:fld id="{3B1C6484-BAD2-482C-9516-CEAD9A582EF7}" type="datetimeFigureOut">
               <a:rPr lang="es-ES" smtClean="0"/>
-              <a:t>05/05/2019</a:t>
+              <a:t>20/05/2019</a:t>
             </a:fld>
             <a:endParaRPr lang="es-ES"/>
           </a:p>
@@ -863,7 +863,7 @@
           <a:p>
             <a:fld id="{3B1C6484-BAD2-482C-9516-CEAD9A582EF7}" type="datetimeFigureOut">
               <a:rPr lang="es-ES" smtClean="0"/>
-              <a:t>05/05/2019</a:t>
+              <a:t>20/05/2019</a:t>
             </a:fld>
             <a:endParaRPr lang="es-ES"/>
           </a:p>
@@ -1138,7 +1138,7 @@
           <a:p>
             <a:fld id="{3B1C6484-BAD2-482C-9516-CEAD9A582EF7}" type="datetimeFigureOut">
               <a:rPr lang="es-ES" smtClean="0"/>
-              <a:t>05/05/2019</a:t>
+              <a:t>20/05/2019</a:t>
             </a:fld>
             <a:endParaRPr lang="es-ES"/>
           </a:p>
@@ -1403,7 +1403,7 @@
           <a:p>
             <a:fld id="{3B1C6484-BAD2-482C-9516-CEAD9A582EF7}" type="datetimeFigureOut">
               <a:rPr lang="es-ES" smtClean="0"/>
-              <a:t>05/05/2019</a:t>
+              <a:t>20/05/2019</a:t>
             </a:fld>
             <a:endParaRPr lang="es-ES"/>
           </a:p>
@@ -1815,7 +1815,7 @@
           <a:p>
             <a:fld id="{3B1C6484-BAD2-482C-9516-CEAD9A582EF7}" type="datetimeFigureOut">
               <a:rPr lang="es-ES" smtClean="0"/>
-              <a:t>05/05/2019</a:t>
+              <a:t>20/05/2019</a:t>
             </a:fld>
             <a:endParaRPr lang="es-ES"/>
           </a:p>
@@ -1956,7 +1956,7 @@
           <a:p>
             <a:fld id="{3B1C6484-BAD2-482C-9516-CEAD9A582EF7}" type="datetimeFigureOut">
               <a:rPr lang="es-ES" smtClean="0"/>
-              <a:t>05/05/2019</a:t>
+              <a:t>20/05/2019</a:t>
             </a:fld>
             <a:endParaRPr lang="es-ES"/>
           </a:p>
@@ -2069,7 +2069,7 @@
           <a:p>
             <a:fld id="{3B1C6484-BAD2-482C-9516-CEAD9A582EF7}" type="datetimeFigureOut">
               <a:rPr lang="es-ES" smtClean="0"/>
-              <a:t>05/05/2019</a:t>
+              <a:t>20/05/2019</a:t>
             </a:fld>
             <a:endParaRPr lang="es-ES"/>
           </a:p>
@@ -2380,7 +2380,7 @@
           <a:p>
             <a:fld id="{3B1C6484-BAD2-482C-9516-CEAD9A582EF7}" type="datetimeFigureOut">
               <a:rPr lang="es-ES" smtClean="0"/>
-              <a:t>05/05/2019</a:t>
+              <a:t>20/05/2019</a:t>
             </a:fld>
             <a:endParaRPr lang="es-ES"/>
           </a:p>
@@ -2668,7 +2668,7 @@
           <a:p>
             <a:fld id="{3B1C6484-BAD2-482C-9516-CEAD9A582EF7}" type="datetimeFigureOut">
               <a:rPr lang="es-ES" smtClean="0"/>
-              <a:t>05/05/2019</a:t>
+              <a:t>20/05/2019</a:t>
             </a:fld>
             <a:endParaRPr lang="es-ES"/>
           </a:p>
@@ -2909,7 +2909,7 @@
           <a:p>
             <a:fld id="{3B1C6484-BAD2-482C-9516-CEAD9A582EF7}" type="datetimeFigureOut">
               <a:rPr lang="es-ES" smtClean="0"/>
-              <a:t>05/05/2019</a:t>
+              <a:t>20/05/2019</a:t>
             </a:fld>
             <a:endParaRPr lang="es-ES"/>
           </a:p>
@@ -3341,9 +3341,9 @@
         <p:grpSpPr>
           <a:xfrm>
             <a:off x="267557" y="176121"/>
-            <a:ext cx="11539708" cy="6440778"/>
+            <a:ext cx="11539708" cy="6248236"/>
             <a:chOff x="27283" y="-68604"/>
-            <a:chExt cx="12154022" cy="6783652"/>
+            <a:chExt cx="12154022" cy="6580860"/>
           </a:xfrm>
         </p:grpSpPr>
         <p:sp>
@@ -3480,7 +3480,7 @@
           </p:nvSpPr>
           <p:spPr bwMode="auto">
             <a:xfrm>
-              <a:off x="2671153" y="5875109"/>
+              <a:off x="3316741" y="4885400"/>
               <a:ext cx="645588" cy="555537"/>
             </a:xfrm>
             <a:prstGeom prst="rect">
@@ -3549,10 +3549,10 @@
           </p:nvGrpSpPr>
           <p:grpSpPr>
             <a:xfrm>
-              <a:off x="532156" y="633323"/>
-              <a:ext cx="10779350" cy="6081725"/>
-              <a:chOff x="532156" y="633323"/>
-              <a:chExt cx="10779350" cy="6081725"/>
+              <a:off x="532156" y="836114"/>
+              <a:ext cx="10779350" cy="5676142"/>
+              <a:chOff x="532156" y="836114"/>
+              <a:chExt cx="10779350" cy="5676142"/>
             </a:xfrm>
           </p:grpSpPr>
           <p:grpSp>
@@ -3569,10 +3569,10 @@
             </p:nvGrpSpPr>
             <p:grpSpPr>
               <a:xfrm>
-                <a:off x="587190" y="633323"/>
-                <a:ext cx="10724316" cy="6081725"/>
-                <a:chOff x="587190" y="352665"/>
-                <a:chExt cx="10724316" cy="6081725"/>
+                <a:off x="587190" y="836114"/>
+                <a:ext cx="10724316" cy="5676142"/>
+                <a:chOff x="587190" y="555456"/>
+                <a:chExt cx="10724316" cy="5676142"/>
               </a:xfrm>
             </p:grpSpPr>
             <p:grpSp>
@@ -3589,10 +3589,10 @@
               </p:nvGrpSpPr>
               <p:grpSpPr>
                 <a:xfrm>
-                  <a:off x="587192" y="352665"/>
-                  <a:ext cx="10724314" cy="6081725"/>
-                  <a:chOff x="116076" y="54864"/>
-                  <a:chExt cx="2706268" cy="1534922"/>
+                  <a:off x="587192" y="555456"/>
+                  <a:ext cx="10724314" cy="5398374"/>
+                  <a:chOff x="116076" y="106045"/>
+                  <a:chExt cx="2706268" cy="1362456"/>
                 </a:xfrm>
               </p:grpSpPr>
               <p:grpSp>
@@ -3609,10 +3609,10 @@
                 </p:nvGrpSpPr>
                 <p:grpSpPr>
                   <a:xfrm>
-                    <a:off x="116076" y="54864"/>
-                    <a:ext cx="2447477" cy="1534922"/>
-                    <a:chOff x="116076" y="54864"/>
-                    <a:chExt cx="2447477" cy="1534922"/>
+                    <a:off x="116076" y="106045"/>
+                    <a:ext cx="2447477" cy="1362456"/>
+                    <a:chOff x="116076" y="106045"/>
+                    <a:chExt cx="2447477" cy="1362456"/>
                   </a:xfrm>
                 </p:grpSpPr>
                 <p:grpSp>
@@ -3629,10 +3629,10 @@
                   </p:nvGrpSpPr>
                   <p:grpSpPr>
                     <a:xfrm>
-                      <a:off x="116076" y="54864"/>
-                      <a:ext cx="1770488" cy="1534922"/>
-                      <a:chOff x="116076" y="54864"/>
-                      <a:chExt cx="1770488" cy="1534922"/>
+                      <a:off x="116076" y="106045"/>
+                      <a:ext cx="1770488" cy="1362456"/>
+                      <a:chOff x="116076" y="106045"/>
+                      <a:chExt cx="1770488" cy="1362456"/>
                     </a:xfrm>
                   </p:grpSpPr>
                   <p:sp>
@@ -3696,10 +3696,10 @@
                   </p:sp>
                   <p:grpSp>
                     <p:nvGrpSpPr>
-                      <p:cNvPr id="15" name="Grupo 14">
+                      <p:cNvPr id="16" name="Grupo 15">
                         <a:extLst>
                           <a:ext uri="{FF2B5EF4-FFF2-40B4-BE49-F238E27FC236}">
-                            <a16:creationId xmlns:a16="http://schemas.microsoft.com/office/drawing/2014/main" id="{4FE2FE60-51AD-43BA-A74F-71EE510737FB}"/>
+                            <a16:creationId xmlns:a16="http://schemas.microsoft.com/office/drawing/2014/main" id="{5ABD8A8A-BD53-4AF7-8E37-EEA9668BB896}"/>
                           </a:ext>
                         </a:extLst>
                       </p:cNvPr>
@@ -3708,18 +3708,18 @@
                     </p:nvGrpSpPr>
                     <p:grpSpPr>
                       <a:xfrm>
-                        <a:off x="116076" y="54864"/>
-                        <a:ext cx="1368838" cy="1534922"/>
-                        <a:chOff x="116076" y="54864"/>
-                        <a:chExt cx="1368838" cy="1534922"/>
+                        <a:off x="116076" y="106045"/>
+                        <a:ext cx="1368838" cy="1362456"/>
+                        <a:chOff x="116076" y="106045"/>
+                        <a:chExt cx="1368838" cy="1362456"/>
                       </a:xfrm>
                     </p:grpSpPr>
                     <p:grpSp>
                       <p:nvGrpSpPr>
-                        <p:cNvPr id="16" name="Grupo 15">
+                        <p:cNvPr id="22" name="Grupo 21">
                           <a:extLst>
                             <a:ext uri="{FF2B5EF4-FFF2-40B4-BE49-F238E27FC236}">
-                              <a16:creationId xmlns:a16="http://schemas.microsoft.com/office/drawing/2014/main" id="{5ABD8A8A-BD53-4AF7-8E37-EEA9668BB896}"/>
+                              <a16:creationId xmlns:a16="http://schemas.microsoft.com/office/drawing/2014/main" id="{E4A53ACE-BA75-43EE-84BD-3556FB051E6B}"/>
                             </a:ext>
                           </a:extLst>
                         </p:cNvPr>
@@ -3728,590 +3728,32 @@
                       </p:nvGrpSpPr>
                       <p:grpSpPr>
                         <a:xfrm>
-                          <a:off x="116076" y="54864"/>
-                          <a:ext cx="729998" cy="1534922"/>
-                          <a:chOff x="116076" y="54864"/>
-                          <a:chExt cx="729998" cy="1534922"/>
-                        </a:xfrm>
-                      </p:grpSpPr>
-                      <p:grpSp>
-                        <p:nvGrpSpPr>
-                          <p:cNvPr id="22" name="Grupo 21">
-                            <a:extLst>
-                              <a:ext uri="{FF2B5EF4-FFF2-40B4-BE49-F238E27FC236}">
-                                <a16:creationId xmlns:a16="http://schemas.microsoft.com/office/drawing/2014/main" id="{E4A53ACE-BA75-43EE-84BD-3556FB051E6B}"/>
-                              </a:ext>
-                            </a:extLst>
-                          </p:cNvPr>
-                          <p:cNvGrpSpPr/>
-                          <p:nvPr/>
-                        </p:nvGrpSpPr>
-                        <p:grpSpPr>
-                          <a:xfrm>
-                            <a:off x="251214" y="54864"/>
-                            <a:ext cx="594860" cy="1534922"/>
-                            <a:chOff x="-29202" y="0"/>
-                            <a:chExt cx="594860" cy="1534922"/>
-                          </a:xfrm>
-                        </p:grpSpPr>
-                        <p:grpSp>
-                          <p:nvGrpSpPr>
-                            <p:cNvPr id="27" name="Grupo 26">
-                              <a:extLst>
-                                <a:ext uri="{FF2B5EF4-FFF2-40B4-BE49-F238E27FC236}">
-                                  <a16:creationId xmlns:a16="http://schemas.microsoft.com/office/drawing/2014/main" id="{8343E8F0-D4D6-471E-9A76-A54BA80539C0}"/>
-                                </a:ext>
-                              </a:extLst>
-                            </p:cNvPr>
-                            <p:cNvGrpSpPr/>
-                            <p:nvPr/>
-                          </p:nvGrpSpPr>
-                          <p:grpSpPr>
-                            <a:xfrm>
-                              <a:off x="323088" y="0"/>
-                              <a:ext cx="242570" cy="1534922"/>
-                              <a:chOff x="24384" y="0"/>
-                              <a:chExt cx="242570" cy="1534922"/>
-                            </a:xfrm>
-                          </p:grpSpPr>
-                          <p:sp>
-                            <p:nvSpPr>
-                              <p:cNvPr id="32" name="Elipse 31">
-                                <a:extLst>
-                                  <a:ext uri="{FF2B5EF4-FFF2-40B4-BE49-F238E27FC236}">
-                                    <a16:creationId xmlns:a16="http://schemas.microsoft.com/office/drawing/2014/main" id="{741DF2E4-9833-4B3E-9EEB-A7571F287418}"/>
-                                  </a:ext>
-                                </a:extLst>
-                              </p:cNvPr>
-                              <p:cNvSpPr/>
-                              <p:nvPr/>
-                            </p:nvSpPr>
-                            <p:spPr>
-                              <a:xfrm>
-                                <a:off x="24384" y="0"/>
-                                <a:ext cx="242570" cy="242570"/>
-                              </a:xfrm>
-                              <a:prstGeom prst="ellipse">
-                                <a:avLst/>
-                              </a:prstGeom>
-                              <a:noFill/>
-                              <a:ln w="19050">
-                                <a:solidFill>
-                                  <a:schemeClr val="tx1"/>
-                                </a:solidFill>
-                              </a:ln>
-                            </p:spPr>
-                            <p:style>
-                              <a:lnRef idx="2">
-                                <a:schemeClr val="accent1">
-                                  <a:shade val="50000"/>
-                                </a:schemeClr>
-                              </a:lnRef>
-                              <a:fillRef idx="1">
-                                <a:schemeClr val="accent1"/>
-                              </a:fillRef>
-                              <a:effectRef idx="0">
-                                <a:schemeClr val="accent1"/>
-                              </a:effectRef>
-                              <a:fontRef idx="minor">
-                                <a:schemeClr val="lt1"/>
-                              </a:fontRef>
-                            </p:style>
-                            <p:txBody>
-                              <a:bodyPr rot="0" spcFirstLastPara="0" vert="horz" wrap="square" lIns="91440" tIns="45720" rIns="91440" bIns="45720" numCol="1" spcCol="0" rtlCol="0" fromWordArt="0" anchor="ctr" anchorCtr="0" forceAA="0" compatLnSpc="1">
-                                <a:prstTxWarp prst="textNoShape">
-                                  <a:avLst/>
-                                </a:prstTxWarp>
-                                <a:noAutofit/>
-                              </a:bodyPr>
-                              <a:lstStyle/>
-                              <a:p>
-                                <a:endParaRPr lang="es-ES" dirty="0">
-                                  <a:latin typeface="Cambria Math" panose="02040503050406030204" pitchFamily="18" charset="0"/>
-                                  <a:ea typeface="Cambria Math" panose="02040503050406030204" pitchFamily="18" charset="0"/>
-                                </a:endParaRPr>
-                              </a:p>
-                            </p:txBody>
-                          </p:sp>
-                          <p:sp>
-                            <p:nvSpPr>
-                              <p:cNvPr id="33" name="Elipse 32">
-                                <a:extLst>
-                                  <a:ext uri="{FF2B5EF4-FFF2-40B4-BE49-F238E27FC236}">
-                                    <a16:creationId xmlns:a16="http://schemas.microsoft.com/office/drawing/2014/main" id="{C93E8444-AD82-4FF9-8B18-FD731B9762C2}"/>
-                                  </a:ext>
-                                </a:extLst>
-                              </p:cNvPr>
-                              <p:cNvSpPr/>
-                              <p:nvPr/>
-                            </p:nvSpPr>
-                            <p:spPr>
-                              <a:xfrm>
-                                <a:off x="24384" y="371856"/>
-                                <a:ext cx="242570" cy="242570"/>
-                              </a:xfrm>
-                              <a:prstGeom prst="ellipse">
-                                <a:avLst/>
-                              </a:prstGeom>
-                              <a:noFill/>
-                              <a:ln w="19050">
-                                <a:solidFill>
-                                  <a:schemeClr val="tx1"/>
-                                </a:solidFill>
-                              </a:ln>
-                            </p:spPr>
-                            <p:style>
-                              <a:lnRef idx="2">
-                                <a:schemeClr val="accent1">
-                                  <a:shade val="50000"/>
-                                </a:schemeClr>
-                              </a:lnRef>
-                              <a:fillRef idx="1">
-                                <a:schemeClr val="accent1"/>
-                              </a:fillRef>
-                              <a:effectRef idx="0">
-                                <a:schemeClr val="accent1"/>
-                              </a:effectRef>
-                              <a:fontRef idx="minor">
-                                <a:schemeClr val="lt1"/>
-                              </a:fontRef>
-                            </p:style>
-                            <p:txBody>
-                              <a:bodyPr rot="0" spcFirstLastPara="0" vert="horz" wrap="square" lIns="91440" tIns="45720" rIns="91440" bIns="45720" numCol="1" spcCol="0" rtlCol="0" fromWordArt="0" anchor="ctr" anchorCtr="0" forceAA="0" compatLnSpc="1">
-                                <a:prstTxWarp prst="textNoShape">
-                                  <a:avLst/>
-                                </a:prstTxWarp>
-                                <a:noAutofit/>
-                              </a:bodyPr>
-                              <a:lstStyle/>
-                              <a:p>
-                                <a:endParaRPr lang="es-ES">
-                                  <a:latin typeface="Cambria Math" panose="02040503050406030204" pitchFamily="18" charset="0"/>
-                                  <a:ea typeface="Cambria Math" panose="02040503050406030204" pitchFamily="18" charset="0"/>
-                                </a:endParaRPr>
-                              </a:p>
-                            </p:txBody>
-                          </p:sp>
-                          <p:sp>
-                            <p:nvSpPr>
-                              <p:cNvPr id="34" name="Elipse 33">
-                                <a:extLst>
-                                  <a:ext uri="{FF2B5EF4-FFF2-40B4-BE49-F238E27FC236}">
-                                    <a16:creationId xmlns:a16="http://schemas.microsoft.com/office/drawing/2014/main" id="{C2423E14-832E-4928-BA73-EC8B82521F61}"/>
-                                  </a:ext>
-                                </a:extLst>
-                              </p:cNvPr>
-                              <p:cNvSpPr/>
-                              <p:nvPr/>
-                            </p:nvSpPr>
-                            <p:spPr>
-                              <a:xfrm>
-                                <a:off x="24384" y="737616"/>
-                                <a:ext cx="242570" cy="242570"/>
-                              </a:xfrm>
-                              <a:prstGeom prst="ellipse">
-                                <a:avLst/>
-                              </a:prstGeom>
-                              <a:noFill/>
-                              <a:ln w="19050">
-                                <a:solidFill>
-                                  <a:schemeClr val="tx1"/>
-                                </a:solidFill>
-                              </a:ln>
-                            </p:spPr>
-                            <p:style>
-                              <a:lnRef idx="2">
-                                <a:schemeClr val="accent1">
-                                  <a:shade val="50000"/>
-                                </a:schemeClr>
-                              </a:lnRef>
-                              <a:fillRef idx="1">
-                                <a:schemeClr val="accent1"/>
-                              </a:fillRef>
-                              <a:effectRef idx="0">
-                                <a:schemeClr val="accent1"/>
-                              </a:effectRef>
-                              <a:fontRef idx="minor">
-                                <a:schemeClr val="lt1"/>
-                              </a:fontRef>
-                            </p:style>
-                            <p:txBody>
-                              <a:bodyPr rot="0" spcFirstLastPara="0" vert="horz" wrap="square" lIns="91440" tIns="45720" rIns="91440" bIns="45720" numCol="1" spcCol="0" rtlCol="0" fromWordArt="0" anchor="ctr" anchorCtr="0" forceAA="0" compatLnSpc="1">
-                                <a:prstTxWarp prst="textNoShape">
-                                  <a:avLst/>
-                                </a:prstTxWarp>
-                                <a:noAutofit/>
-                              </a:bodyPr>
-                              <a:lstStyle/>
-                              <a:p>
-                                <a:endParaRPr lang="es-ES">
-                                  <a:latin typeface="Cambria Math" panose="02040503050406030204" pitchFamily="18" charset="0"/>
-                                  <a:ea typeface="Cambria Math" panose="02040503050406030204" pitchFamily="18" charset="0"/>
-                                </a:endParaRPr>
-                              </a:p>
-                            </p:txBody>
-                          </p:sp>
-                          <p:sp>
-                            <p:nvSpPr>
-                              <p:cNvPr id="35" name="Elipse 34">
-                                <a:extLst>
-                                  <a:ext uri="{FF2B5EF4-FFF2-40B4-BE49-F238E27FC236}">
-                                    <a16:creationId xmlns:a16="http://schemas.microsoft.com/office/drawing/2014/main" id="{EECD2FD1-ABC3-4DA6-86F5-C977BD114F50}"/>
-                                  </a:ext>
-                                </a:extLst>
-                              </p:cNvPr>
-                              <p:cNvSpPr/>
-                              <p:nvPr/>
-                            </p:nvSpPr>
-                            <p:spPr>
-                              <a:xfrm>
-                                <a:off x="24384" y="1292352"/>
-                                <a:ext cx="242570" cy="242570"/>
-                              </a:xfrm>
-                              <a:prstGeom prst="ellipse">
-                                <a:avLst/>
-                              </a:prstGeom>
-                              <a:noFill/>
-                              <a:ln w="19050">
-                                <a:solidFill>
-                                  <a:schemeClr val="tx1"/>
-                                </a:solidFill>
-                              </a:ln>
-                            </p:spPr>
-                            <p:style>
-                              <a:lnRef idx="2">
-                                <a:schemeClr val="accent1">
-                                  <a:shade val="50000"/>
-                                </a:schemeClr>
-                              </a:lnRef>
-                              <a:fillRef idx="1">
-                                <a:schemeClr val="accent1"/>
-                              </a:fillRef>
-                              <a:effectRef idx="0">
-                                <a:schemeClr val="accent1"/>
-                              </a:effectRef>
-                              <a:fontRef idx="minor">
-                                <a:schemeClr val="lt1"/>
-                              </a:fontRef>
-                            </p:style>
-                            <p:txBody>
-                              <a:bodyPr rot="0" spcFirstLastPara="0" vert="horz" wrap="square" lIns="91440" tIns="45720" rIns="91440" bIns="45720" numCol="1" spcCol="0" rtlCol="0" fromWordArt="0" anchor="ctr" anchorCtr="0" forceAA="0" compatLnSpc="1">
-                                <a:prstTxWarp prst="textNoShape">
-                                  <a:avLst/>
-                                </a:prstTxWarp>
-                                <a:noAutofit/>
-                              </a:bodyPr>
-                              <a:lstStyle/>
-                              <a:p>
-                                <a:endParaRPr lang="es-ES">
-                                  <a:latin typeface="Cambria Math" panose="02040503050406030204" pitchFamily="18" charset="0"/>
-                                  <a:ea typeface="Cambria Math" panose="02040503050406030204" pitchFamily="18" charset="0"/>
-                                </a:endParaRPr>
-                              </a:p>
-                            </p:txBody>
-                          </p:sp>
-                        </p:grpSp>
-                        <p:cxnSp>
-                          <p:nvCxnSpPr>
-                            <p:cNvPr id="28" name="Conector recto de flecha 27">
-                              <a:extLst>
-                                <a:ext uri="{FF2B5EF4-FFF2-40B4-BE49-F238E27FC236}">
-                                  <a16:creationId xmlns:a16="http://schemas.microsoft.com/office/drawing/2014/main" id="{9A5973D4-2455-4E0A-B856-E288952F6057}"/>
-                                </a:ext>
-                              </a:extLst>
-                            </p:cNvPr>
-                            <p:cNvCxnSpPr>
-                              <a:cxnSpLocks/>
-                              <a:stCxn id="23" idx="3"/>
-                              <a:endCxn id="32" idx="2"/>
-                            </p:cNvCxnSpPr>
-                            <p:nvPr/>
-                          </p:nvCxnSpPr>
-                          <p:spPr>
-                            <a:xfrm>
-                              <a:off x="-29202" y="121285"/>
-                              <a:ext cx="352290" cy="0"/>
-                            </a:xfrm>
-                            <a:prstGeom prst="straightConnector1">
-                              <a:avLst/>
-                            </a:prstGeom>
-                            <a:ln w="19050">
-                              <a:solidFill>
-                                <a:schemeClr val="tx1"/>
-                              </a:solidFill>
-                              <a:headEnd type="oval" w="lg" len="lg"/>
-                              <a:tailEnd type="triangle" w="lg" len="med"/>
-                            </a:ln>
-                          </p:spPr>
-                          <p:style>
-                            <a:lnRef idx="1">
-                              <a:schemeClr val="accent1"/>
-                            </a:lnRef>
-                            <a:fillRef idx="0">
-                              <a:schemeClr val="accent1"/>
-                            </a:fillRef>
-                            <a:effectRef idx="0">
-                              <a:schemeClr val="accent1"/>
-                            </a:effectRef>
-                            <a:fontRef idx="minor">
-                              <a:schemeClr val="tx1"/>
-                            </a:fontRef>
-                          </p:style>
-                        </p:cxnSp>
-                        <p:cxnSp>
-                          <p:nvCxnSpPr>
-                            <p:cNvPr id="29" name="Conector recto de flecha 28">
-                              <a:extLst>
-                                <a:ext uri="{FF2B5EF4-FFF2-40B4-BE49-F238E27FC236}">
-                                  <a16:creationId xmlns:a16="http://schemas.microsoft.com/office/drawing/2014/main" id="{1631B81F-DE86-40B4-8690-C2FC02C8EAD0}"/>
-                                </a:ext>
-                              </a:extLst>
-                            </p:cNvPr>
-                            <p:cNvCxnSpPr>
-                              <a:cxnSpLocks/>
-                              <a:stCxn id="46" idx="3"/>
-                              <a:endCxn id="33" idx="2"/>
-                            </p:cNvCxnSpPr>
-                            <p:nvPr/>
-                          </p:nvCxnSpPr>
-                          <p:spPr>
-                            <a:xfrm>
-                              <a:off x="-29202" y="493141"/>
-                              <a:ext cx="352290" cy="0"/>
-                            </a:xfrm>
-                            <a:prstGeom prst="straightConnector1">
-                              <a:avLst/>
-                            </a:prstGeom>
-                            <a:ln w="19050">
-                              <a:solidFill>
-                                <a:schemeClr val="tx1"/>
-                              </a:solidFill>
-                              <a:headEnd type="oval" w="lg" len="lg"/>
-                              <a:tailEnd type="triangle" w="lg" len="med"/>
-                            </a:ln>
-                          </p:spPr>
-                          <p:style>
-                            <a:lnRef idx="1">
-                              <a:schemeClr val="accent1"/>
-                            </a:lnRef>
-                            <a:fillRef idx="0">
-                              <a:schemeClr val="accent1"/>
-                            </a:fillRef>
-                            <a:effectRef idx="0">
-                              <a:schemeClr val="accent1"/>
-                            </a:effectRef>
-                            <a:fontRef idx="minor">
-                              <a:schemeClr val="tx1"/>
-                            </a:fontRef>
-                          </p:style>
-                        </p:cxnSp>
-                        <p:cxnSp>
-                          <p:nvCxnSpPr>
-                            <p:cNvPr id="30" name="Conector recto de flecha 29">
-                              <a:extLst>
-                                <a:ext uri="{FF2B5EF4-FFF2-40B4-BE49-F238E27FC236}">
-                                  <a16:creationId xmlns:a16="http://schemas.microsoft.com/office/drawing/2014/main" id="{F2137565-5268-4DB5-BDF2-F1E44540D032}"/>
-                                </a:ext>
-                              </a:extLst>
-                            </p:cNvPr>
-                            <p:cNvCxnSpPr>
-                              <a:cxnSpLocks/>
-                              <a:stCxn id="47" idx="3"/>
-                              <a:endCxn id="34" idx="2"/>
-                            </p:cNvCxnSpPr>
-                            <p:nvPr/>
-                          </p:nvCxnSpPr>
-                          <p:spPr>
-                            <a:xfrm>
-                              <a:off x="-29202" y="858901"/>
-                              <a:ext cx="352290" cy="0"/>
-                            </a:xfrm>
-                            <a:prstGeom prst="straightConnector1">
-                              <a:avLst/>
-                            </a:prstGeom>
-                            <a:ln w="19050">
-                              <a:solidFill>
-                                <a:schemeClr val="tx1"/>
-                              </a:solidFill>
-                              <a:headEnd type="oval" w="lg" len="lg"/>
-                              <a:tailEnd type="triangle" w="lg" len="med"/>
-                            </a:ln>
-                          </p:spPr>
-                          <p:style>
-                            <a:lnRef idx="1">
-                              <a:schemeClr val="accent1"/>
-                            </a:lnRef>
-                            <a:fillRef idx="0">
-                              <a:schemeClr val="accent1"/>
-                            </a:fillRef>
-                            <a:effectRef idx="0">
-                              <a:schemeClr val="accent1"/>
-                            </a:effectRef>
-                            <a:fontRef idx="minor">
-                              <a:schemeClr val="tx1"/>
-                            </a:fontRef>
-                          </p:style>
-                        </p:cxnSp>
-                        <p:cxnSp>
-                          <p:nvCxnSpPr>
-                            <p:cNvPr id="31" name="Conector recto de flecha 30">
-                              <a:extLst>
-                                <a:ext uri="{FF2B5EF4-FFF2-40B4-BE49-F238E27FC236}">
-                                  <a16:creationId xmlns:a16="http://schemas.microsoft.com/office/drawing/2014/main" id="{6D9EA212-CA13-49B3-9322-634E16A2A065}"/>
-                                </a:ext>
-                              </a:extLst>
-                            </p:cNvPr>
-                            <p:cNvCxnSpPr>
-                              <a:cxnSpLocks/>
-                              <a:stCxn id="48" idx="3"/>
-                              <a:endCxn id="35" idx="2"/>
-                            </p:cNvCxnSpPr>
-                            <p:nvPr/>
-                          </p:nvCxnSpPr>
-                          <p:spPr>
-                            <a:xfrm>
-                              <a:off x="-29202" y="1413637"/>
-                              <a:ext cx="352290" cy="0"/>
-                            </a:xfrm>
-                            <a:prstGeom prst="straightConnector1">
-                              <a:avLst/>
-                            </a:prstGeom>
-                            <a:ln w="19050">
-                              <a:solidFill>
-                                <a:schemeClr val="tx1"/>
-                              </a:solidFill>
-                              <a:headEnd type="oval" w="lg" len="lg"/>
-                              <a:tailEnd type="triangle" w="lg" len="med"/>
-                            </a:ln>
-                          </p:spPr>
-                          <p:style>
-                            <a:lnRef idx="1">
-                              <a:schemeClr val="accent1"/>
-                            </a:lnRef>
-                            <a:fillRef idx="0">
-                              <a:schemeClr val="accent1"/>
-                            </a:fillRef>
-                            <a:effectRef idx="0">
-                              <a:schemeClr val="accent1"/>
-                            </a:effectRef>
-                            <a:fontRef idx="minor">
-                              <a:schemeClr val="tx1"/>
-                            </a:fontRef>
-                          </p:style>
-                        </p:cxnSp>
-                      </p:grpSp>
-                      <p:sp>
-                        <p:nvSpPr>
-                          <p:cNvPr id="23" name="Cuadro de texto 2">
-                            <a:extLst>
-                              <a:ext uri="{FF2B5EF4-FFF2-40B4-BE49-F238E27FC236}">
-                                <a16:creationId xmlns:a16="http://schemas.microsoft.com/office/drawing/2014/main" id="{1C53764A-E015-4CAE-B1EF-57F2593B5DE9}"/>
-                              </a:ext>
-                            </a:extLst>
-                          </p:cNvPr>
-                          <p:cNvSpPr txBox="1">
-                            <a:spLocks noChangeArrowheads="1"/>
-                          </p:cNvSpPr>
-                          <p:nvPr/>
-                        </p:nvSpPr>
-                        <p:spPr bwMode="auto">
-                          <a:xfrm>
-                            <a:off x="116076" y="106045"/>
-                            <a:ext cx="135138" cy="140208"/>
-                          </a:xfrm>
-                          <a:prstGeom prst="rect">
-                            <a:avLst/>
-                          </a:prstGeom>
-                          <a:noFill/>
-                          <a:ln w="19050">
-                            <a:noFill/>
-                            <a:miter lim="800000"/>
-                            <a:headEnd/>
-                            <a:tailEnd/>
-                          </a:ln>
-                        </p:spPr>
-                        <p:txBody>
-                          <a:bodyPr rot="0" vert="horz" wrap="square" lIns="91440" tIns="45720" rIns="91440" bIns="45720" anchor="ctr" anchorCtr="0">
-                            <a:noAutofit/>
-                          </a:bodyPr>
-                          <a:lstStyle/>
-                          <a:p>
-                            <a:pPr algn="ctr">
-                              <a:lnSpc>
-                                <a:spcPct val="107000"/>
-                              </a:lnSpc>
-                              <a:spcAft>
-                                <a:spcPts val="800"/>
-                              </a:spcAft>
-                            </a:pPr>
-                            <a:r>
-                              <a:rPr lang="es-ES" sz="2400" dirty="0">
-                                <a:effectLst/>
-                                <a:latin typeface="Cambria Math" panose="02040503050406030204" pitchFamily="18" charset="0"/>
-                                <a:ea typeface="Cambria Math" panose="02040503050406030204" pitchFamily="18" charset="0"/>
-                                <a:cs typeface="Times New Roman" panose="02020603050405020304" pitchFamily="18" charset="0"/>
-                              </a:rPr>
-                              <a:t>x</a:t>
-                            </a:r>
-                            <a:r>
-                              <a:rPr lang="es-ES" sz="2400" baseline="-25000" dirty="0">
-                                <a:effectLst/>
-                                <a:latin typeface="Cambria Math" panose="02040503050406030204" pitchFamily="18" charset="0"/>
-                                <a:ea typeface="Cambria Math" panose="02040503050406030204" pitchFamily="18" charset="0"/>
-                                <a:cs typeface="Times New Roman" panose="02020603050405020304" pitchFamily="18" charset="0"/>
-                              </a:rPr>
-                              <a:t>1</a:t>
-                            </a:r>
-                            <a:endParaRPr lang="es-ES" sz="2400" dirty="0">
-                              <a:effectLst/>
-                              <a:latin typeface="Cambria Math" panose="02040503050406030204" pitchFamily="18" charset="0"/>
-                              <a:ea typeface="Cambria Math" panose="02040503050406030204" pitchFamily="18" charset="0"/>
-                              <a:cs typeface="Times New Roman" panose="02020603050405020304" pitchFamily="18" charset="0"/>
-                            </a:endParaRPr>
-                          </a:p>
-                        </p:txBody>
-                      </p:sp>
-                    </p:grpSp>
-                    <p:grpSp>
-                      <p:nvGrpSpPr>
-                        <p:cNvPr id="17" name="Grupo 16">
-                          <a:extLst>
-                            <a:ext uri="{FF2B5EF4-FFF2-40B4-BE49-F238E27FC236}">
-                              <a16:creationId xmlns:a16="http://schemas.microsoft.com/office/drawing/2014/main" id="{AEF519CF-C746-4A02-B8CA-DB9C00152FF1}"/>
-                            </a:ext>
-                          </a:extLst>
-                        </p:cNvPr>
-                        <p:cNvGrpSpPr/>
-                        <p:nvPr/>
-                      </p:nvGrpSpPr>
-                      <p:grpSpPr>
-                        <a:xfrm>
-                          <a:off x="846074" y="176149"/>
-                          <a:ext cx="638840" cy="1292352"/>
-                          <a:chOff x="-20824" y="-7919"/>
-                          <a:chExt cx="638840" cy="1292352"/>
+                          <a:off x="251214" y="176149"/>
+                          <a:ext cx="1233700" cy="1292352"/>
+                          <a:chOff x="-29202" y="121285"/>
+                          <a:chExt cx="1233700" cy="1292352"/>
                         </a:xfrm>
                       </p:grpSpPr>
                       <p:cxnSp>
                         <p:nvCxnSpPr>
-                          <p:cNvPr id="18" name="Conector recto de flecha 17">
+                          <p:cNvPr id="28" name="Conector recto de flecha 27">
                             <a:extLst>
                               <a:ext uri="{FF2B5EF4-FFF2-40B4-BE49-F238E27FC236}">
-                                <a16:creationId xmlns:a16="http://schemas.microsoft.com/office/drawing/2014/main" id="{4F2A908F-5CF6-40F8-8130-FFE9FFFAEED7}"/>
+                                <a16:creationId xmlns:a16="http://schemas.microsoft.com/office/drawing/2014/main" id="{9A5973D4-2455-4E0A-B856-E288952F6057}"/>
                               </a:ext>
                             </a:extLst>
                           </p:cNvPr>
                           <p:cNvCxnSpPr>
                             <a:cxnSpLocks/>
-                            <a:stCxn id="32" idx="6"/>
+                            <a:stCxn id="23" idx="3"/>
                             <a:endCxn id="14" idx="2"/>
                           </p:cNvCxnSpPr>
                           <p:nvPr/>
                         </p:nvCxnSpPr>
                         <p:spPr>
                           <a:xfrm>
-                            <a:off x="-20824" y="-7919"/>
-                            <a:ext cx="638840" cy="616331"/>
+                            <a:off x="-29202" y="121285"/>
+                            <a:ext cx="1233700" cy="616331"/>
                           </a:xfrm>
                           <a:prstGeom prst="straightConnector1">
                             <a:avLst/>
@@ -4320,7 +3762,8 @@
                             <a:solidFill>
                               <a:schemeClr val="tx1"/>
                             </a:solidFill>
-                            <a:tailEnd type="triangle" w="med" len="sm"/>
+                            <a:headEnd type="oval" w="lg" len="lg"/>
+                            <a:tailEnd type="triangle" w="lg" len="lg"/>
                           </a:ln>
                         </p:spPr>
                         <p:style>
@@ -4340,24 +3783,24 @@
                       </p:cxnSp>
                       <p:cxnSp>
                         <p:nvCxnSpPr>
-                          <p:cNvPr id="19" name="Conector recto de flecha 18">
+                          <p:cNvPr id="29" name="Conector recto de flecha 28">
                             <a:extLst>
                               <a:ext uri="{FF2B5EF4-FFF2-40B4-BE49-F238E27FC236}">
-                                <a16:creationId xmlns:a16="http://schemas.microsoft.com/office/drawing/2014/main" id="{BE206640-87DB-4FE8-9683-8DDF142810F6}"/>
+                                <a16:creationId xmlns:a16="http://schemas.microsoft.com/office/drawing/2014/main" id="{1631B81F-DE86-40B4-8690-C2FC02C8EAD0}"/>
                               </a:ext>
                             </a:extLst>
                           </p:cNvPr>
                           <p:cNvCxnSpPr>
                             <a:cxnSpLocks/>
-                            <a:stCxn id="33" idx="6"/>
+                            <a:stCxn id="46" idx="3"/>
                             <a:endCxn id="14" idx="2"/>
                           </p:cNvCxnSpPr>
                           <p:nvPr/>
                         </p:nvCxnSpPr>
                         <p:spPr>
                           <a:xfrm>
-                            <a:off x="-20824" y="363937"/>
-                            <a:ext cx="638840" cy="244475"/>
+                            <a:off x="-29202" y="493141"/>
+                            <a:ext cx="1233700" cy="244475"/>
                           </a:xfrm>
                           <a:prstGeom prst="straightConnector1">
                             <a:avLst/>
@@ -4366,7 +3809,8 @@
                             <a:solidFill>
                               <a:schemeClr val="tx1"/>
                             </a:solidFill>
-                            <a:tailEnd type="triangle" w="med" len="sm"/>
+                            <a:headEnd type="oval" w="lg" len="lg"/>
+                            <a:tailEnd type="triangle" w="lg" len="lg"/>
                           </a:ln>
                         </p:spPr>
                         <p:style>
@@ -4386,24 +3830,24 @@
                       </p:cxnSp>
                       <p:cxnSp>
                         <p:nvCxnSpPr>
-                          <p:cNvPr id="20" name="Conector recto de flecha 19">
+                          <p:cNvPr id="30" name="Conector recto de flecha 29">
                             <a:extLst>
                               <a:ext uri="{FF2B5EF4-FFF2-40B4-BE49-F238E27FC236}">
-                                <a16:creationId xmlns:a16="http://schemas.microsoft.com/office/drawing/2014/main" id="{62CAB57A-5FA8-46D1-9652-25EA88E00CE9}"/>
+                                <a16:creationId xmlns:a16="http://schemas.microsoft.com/office/drawing/2014/main" id="{F2137565-5268-4DB5-BDF2-F1E44540D032}"/>
                               </a:ext>
                             </a:extLst>
                           </p:cNvPr>
                           <p:cNvCxnSpPr>
                             <a:cxnSpLocks/>
-                            <a:stCxn id="34" idx="6"/>
+                            <a:stCxn id="47" idx="3"/>
                             <a:endCxn id="14" idx="2"/>
                           </p:cNvCxnSpPr>
                           <p:nvPr/>
                         </p:nvCxnSpPr>
                         <p:spPr>
                           <a:xfrm flipV="1">
-                            <a:off x="-20824" y="608412"/>
-                            <a:ext cx="638840" cy="121285"/>
+                            <a:off x="-29202" y="737616"/>
+                            <a:ext cx="1233700" cy="121285"/>
                           </a:xfrm>
                           <a:prstGeom prst="straightConnector1">
                             <a:avLst/>
@@ -4412,7 +3856,8 @@
                             <a:solidFill>
                               <a:schemeClr val="tx1"/>
                             </a:solidFill>
-                            <a:tailEnd type="triangle" w="med" len="sm"/>
+                            <a:headEnd type="oval" w="lg" len="lg"/>
+                            <a:tailEnd type="triangle" w="lg" len="lg"/>
                           </a:ln>
                         </p:spPr>
                         <p:style>
@@ -4432,24 +3877,24 @@
                       </p:cxnSp>
                       <p:cxnSp>
                         <p:nvCxnSpPr>
-                          <p:cNvPr id="21" name="Conector recto de flecha 20">
+                          <p:cNvPr id="31" name="Conector recto de flecha 30">
                             <a:extLst>
                               <a:ext uri="{FF2B5EF4-FFF2-40B4-BE49-F238E27FC236}">
-                                <a16:creationId xmlns:a16="http://schemas.microsoft.com/office/drawing/2014/main" id="{159B73DD-8DA6-4BB3-9C6E-5AF4F7F877E5}"/>
+                                <a16:creationId xmlns:a16="http://schemas.microsoft.com/office/drawing/2014/main" id="{6D9EA212-CA13-49B3-9322-634E16A2A065}"/>
                               </a:ext>
                             </a:extLst>
                           </p:cNvPr>
                           <p:cNvCxnSpPr>
                             <a:cxnSpLocks/>
-                            <a:stCxn id="35" idx="6"/>
+                            <a:stCxn id="48" idx="3"/>
                             <a:endCxn id="14" idx="2"/>
                           </p:cNvCxnSpPr>
                           <p:nvPr/>
                         </p:nvCxnSpPr>
                         <p:spPr>
                           <a:xfrm flipV="1">
-                            <a:off x="-20824" y="608412"/>
-                            <a:ext cx="638840" cy="676021"/>
+                            <a:off x="-29202" y="737616"/>
+                            <a:ext cx="1233700" cy="676021"/>
                           </a:xfrm>
                           <a:prstGeom prst="straightConnector1">
                             <a:avLst/>
@@ -4458,7 +3903,8 @@
                             <a:solidFill>
                               <a:schemeClr val="tx1"/>
                             </a:solidFill>
-                            <a:tailEnd type="triangle" w="med" len="sm"/>
+                            <a:headEnd type="oval" w="lg" len="lg"/>
+                            <a:tailEnd type="triangle" w="lg" len="lg"/>
                           </a:ln>
                         </p:spPr>
                         <p:style>
@@ -4477,6 +3923,77 @@
                         </p:style>
                       </p:cxnSp>
                     </p:grpSp>
+                    <p:sp>
+                      <p:nvSpPr>
+                        <p:cNvPr id="23" name="Cuadro de texto 2">
+                          <a:extLst>
+                            <a:ext uri="{FF2B5EF4-FFF2-40B4-BE49-F238E27FC236}">
+                              <a16:creationId xmlns:a16="http://schemas.microsoft.com/office/drawing/2014/main" id="{1C53764A-E015-4CAE-B1EF-57F2593B5DE9}"/>
+                            </a:ext>
+                          </a:extLst>
+                        </p:cNvPr>
+                        <p:cNvSpPr txBox="1">
+                          <a:spLocks noChangeArrowheads="1"/>
+                        </p:cNvSpPr>
+                        <p:nvPr/>
+                      </p:nvSpPr>
+                      <p:spPr bwMode="auto">
+                        <a:xfrm>
+                          <a:off x="116076" y="106045"/>
+                          <a:ext cx="135138" cy="140208"/>
+                        </a:xfrm>
+                        <a:prstGeom prst="rect">
+                          <a:avLst/>
+                        </a:prstGeom>
+                        <a:noFill/>
+                        <a:ln w="19050">
+                          <a:noFill/>
+                          <a:miter lim="800000"/>
+                          <a:headEnd/>
+                          <a:tailEnd/>
+                        </a:ln>
+                      </p:spPr>
+                      <p:txBody>
+                        <a:bodyPr rot="0" vert="horz" wrap="square" lIns="91440" tIns="45720" rIns="91440" bIns="45720" anchor="ctr" anchorCtr="0">
+                          <a:noAutofit/>
+                        </a:bodyPr>
+                        <a:lstStyle/>
+                        <a:p>
+                          <a:pPr algn="ctr">
+                            <a:lnSpc>
+                              <a:spcPct val="107000"/>
+                            </a:lnSpc>
+                            <a:spcAft>
+                              <a:spcPts val="800"/>
+                            </a:spcAft>
+                          </a:pPr>
+                          <a:r>
+                            <a:rPr lang="es-ES" sz="2400" dirty="0">
+                              <a:effectLst/>
+                              <a:latin typeface="Cambria Math" panose="02040503050406030204" pitchFamily="18" charset="0"/>
+                              <a:ea typeface="Cambria Math" panose="02040503050406030204" pitchFamily="18" charset="0"/>
+                              <a:cs typeface="Times New Roman" panose="02020603050405020304" pitchFamily="18" charset="0"/>
+                            </a:rPr>
+                            <a:t>x</a:t>
+                          </a:r>
+                          <a:r>
+                            <a:rPr lang="es-ES" sz="2400" baseline="-25000" dirty="0">
+                              <a:effectLst/>
+                              <a:latin typeface="Cambria Math" panose="02040503050406030204" pitchFamily="18" charset="0"/>
+                              <a:ea typeface="Cambria Math" panose="02040503050406030204" pitchFamily="18" charset="0"/>
+                              <a:cs typeface="Times New Roman" panose="02020603050405020304" pitchFamily="18" charset="0"/>
+                            </a:rPr>
+                            <a:t>1</a:t>
+                          </a:r>
+                          <a:endParaRPr lang="es-ES" sz="2400" dirty="0">
+                            <a:effectLst/>
+                            <a:latin typeface="Cambria Math" panose="02040503050406030204" pitchFamily="18" charset="0"/>
+                            <a:ea typeface="Cambria Math" panose="02040503050406030204" pitchFamily="18" charset="0"/>
+                            <a:cs typeface="Times New Roman" panose="02020603050405020304" pitchFamily="18" charset="0"/>
+                          </a:endParaRPr>
+                        </a:p>
+                      </p:txBody>
+                    </p:sp>
                   </p:grpSp>
                 </p:grpSp>
                 <p:sp>
@@ -4855,7 +4372,7 @@
             </p:nvSpPr>
             <p:spPr bwMode="auto">
               <a:xfrm>
-                <a:off x="2676585" y="785054"/>
+                <a:off x="3316740" y="1698410"/>
                 <a:ext cx="645588" cy="555537"/>
               </a:xfrm>
               <a:prstGeom prst="rect">
@@ -4926,7 +4443,7 @@
             </p:nvSpPr>
             <p:spPr bwMode="auto">
               <a:xfrm>
-                <a:off x="2673014" y="2275781"/>
+                <a:off x="2673014" y="2407673"/>
                 <a:ext cx="645588" cy="555537"/>
               </a:xfrm>
               <a:prstGeom prst="rect">
@@ -4997,7 +4514,7 @@
             </p:nvSpPr>
             <p:spPr bwMode="auto">
               <a:xfrm>
-                <a:off x="2671153" y="3709659"/>
+                <a:off x="2671153" y="3758723"/>
                 <a:ext cx="645588" cy="555537"/>
               </a:xfrm>
               <a:prstGeom prst="rect">
@@ -5042,97 +4559,6 @@
                     <a:cs typeface="Times New Roman" panose="02020603050405020304" pitchFamily="18" charset="0"/>
                   </a:rPr>
                   <a:t>i3</a:t>
-                </a:r>
-                <a:endParaRPr lang="es-ES" sz="2400" dirty="0">
-                  <a:effectLst/>
-                  <a:latin typeface="Cambria Math" panose="02040503050406030204" pitchFamily="18" charset="0"/>
-                  <a:ea typeface="Cambria Math" panose="02040503050406030204" pitchFamily="18" charset="0"/>
-                  <a:cs typeface="Times New Roman" panose="02020603050405020304" pitchFamily="18" charset="0"/>
-                </a:endParaRPr>
-              </a:p>
-            </p:txBody>
-          </p:sp>
-          <p:sp>
-            <p:nvSpPr>
-              <p:cNvPr id="90" name="Cuadro de texto 2">
-                <a:extLst>
-                  <a:ext uri="{FF2B5EF4-FFF2-40B4-BE49-F238E27FC236}">
-                    <a16:creationId xmlns:a16="http://schemas.microsoft.com/office/drawing/2014/main" id="{59621B03-76A1-471F-8BF8-E29A935B7606}"/>
-                  </a:ext>
-                </a:extLst>
-              </p:cNvPr>
-              <p:cNvSpPr txBox="1">
-                <a:spLocks noChangeArrowheads="1"/>
-              </p:cNvSpPr>
-              <p:nvPr/>
-            </p:nvSpPr>
-            <p:spPr bwMode="auto">
-              <a:xfrm>
-                <a:off x="2671153" y="4400189"/>
-                <a:ext cx="645588" cy="1323472"/>
-              </a:xfrm>
-              <a:prstGeom prst="rect">
-                <a:avLst/>
-              </a:prstGeom>
-              <a:noFill/>
-              <a:ln w="19050">
-                <a:noFill/>
-                <a:miter lim="800000"/>
-                <a:headEnd/>
-                <a:tailEnd/>
-              </a:ln>
-            </p:spPr>
-            <p:txBody>
-              <a:bodyPr rot="0" vert="horz" wrap="square" lIns="91440" tIns="45720" rIns="91440" bIns="45720" anchor="ctr" anchorCtr="0">
-                <a:noAutofit/>
-              </a:bodyPr>
-              <a:lstStyle/>
-              <a:p>
-                <a:pPr algn="ctr">
-                  <a:lnSpc>
-                    <a:spcPct val="107000"/>
-                  </a:lnSpc>
-                  <a:spcAft>
-                    <a:spcPts val="800"/>
-                  </a:spcAft>
-                </a:pPr>
-                <a:r>
-                  <a:rPr lang="es-ES" dirty="0">
-                    <a:latin typeface="Cambria Math" panose="02040503050406030204" pitchFamily="18" charset="0"/>
-                    <a:ea typeface="Cambria Math" panose="02040503050406030204" pitchFamily="18" charset="0"/>
-                    <a:cs typeface="Times New Roman" panose="02020603050405020304" pitchFamily="18" charset="0"/>
-                  </a:rPr>
-                  <a:t>.</a:t>
-                </a:r>
-                <a:br>
-                  <a:rPr lang="es-ES" dirty="0">
-                    <a:latin typeface="Cambria Math" panose="02040503050406030204" pitchFamily="18" charset="0"/>
-                    <a:ea typeface="Cambria Math" panose="02040503050406030204" pitchFamily="18" charset="0"/>
-                    <a:cs typeface="Times New Roman" panose="02020603050405020304" pitchFamily="18" charset="0"/>
-                  </a:rPr>
-                </a:br>
-                <a:r>
-                  <a:rPr lang="es-ES" dirty="0">
-                    <a:latin typeface="Cambria Math" panose="02040503050406030204" pitchFamily="18" charset="0"/>
-                    <a:ea typeface="Cambria Math" panose="02040503050406030204" pitchFamily="18" charset="0"/>
-                    <a:cs typeface="Times New Roman" panose="02020603050405020304" pitchFamily="18" charset="0"/>
-                  </a:rPr>
-                  <a:t>.</a:t>
-                </a:r>
-                <a:br>
-                  <a:rPr lang="es-ES" dirty="0">
-                    <a:latin typeface="Cambria Math" panose="02040503050406030204" pitchFamily="18" charset="0"/>
-                    <a:ea typeface="Cambria Math" panose="02040503050406030204" pitchFamily="18" charset="0"/>
-                    <a:cs typeface="Times New Roman" panose="02020603050405020304" pitchFamily="18" charset="0"/>
-                  </a:rPr>
-                </a:br>
-                <a:r>
-                  <a:rPr lang="es-ES" dirty="0">
-                    <a:latin typeface="Cambria Math" panose="02040503050406030204" pitchFamily="18" charset="0"/>
-                    <a:ea typeface="Cambria Math" panose="02040503050406030204" pitchFamily="18" charset="0"/>
-                    <a:cs typeface="Times New Roman" panose="02020603050405020304" pitchFamily="18" charset="0"/>
-                  </a:rPr>
-                  <a:t>.</a:t>
                 </a:r>
                 <a:endParaRPr lang="es-ES" sz="2400" dirty="0">
                   <a:effectLst/>

</xml_diff>